<commit_message>
work in progress. 	modified:   data_exploration/fx data exploration.pptx 	deleted:    fxdata/HISTDATA_COM_ASCII_AUDCHF_M12008/DAT_ASCII_AUDCHF_M1_2008.csv-date-vol 	deleted:    fxdata/HISTDATA_COM_ASCII_AUDUSD_M12001/DAT_ASCII_AUDUSD_M1_2001.csv-date-vol
</commit_message>
<xml_diff>
--- a/data_exploration/fx data exploration.pptx
+++ b/data_exploration/fx data exploration.pptx
@@ -3153,37 +3153,15 @@
           </a:p>
           <a:p>
             <a:r>
-              <a:rPr lang="en-US" b="1" smtClean="0"/>
-              <a:t>Fields: DateTime,Open,High,Low,Close,Volume</a:t>
+              <a:rPr lang="en-US" b="1" dirty="0" smtClean="0"/>
+              <a:t>Fields: </a:t>
+            </a:r>
+            <a:r>
+              <a:rPr lang="en-US" b="1" dirty="0" err="1" smtClean="0"/>
+              <a:t>DateTime,Open,High,Low,Close,Volume</a:t>
             </a:r>
             <a:endParaRPr lang="en-US" dirty="0" smtClean="0"/>
           </a:p>
-          <a:p>
-            <a:endParaRPr lang="en-US" dirty="0"/>
-          </a:p>
-        </p:txBody>
-      </p:sp>
-      <p:sp>
-        <p:nvSpPr>
-          <p:cNvPr id="4" name="TextBox 3"/>
-          <p:cNvSpPr txBox="1"/>
-          <p:nvPr/>
-        </p:nvSpPr>
-        <p:spPr>
-          <a:xfrm>
-            <a:off x="5112327" y="2549236"/>
-            <a:ext cx="184731" cy="369332"/>
-          </a:xfrm>
-          <a:prstGeom prst="rect">
-            <a:avLst/>
-          </a:prstGeom>
-          <a:noFill/>
-        </p:spPr>
-        <p:txBody>
-          <a:bodyPr wrap="none" rtlCol="0">
-            <a:spAutoFit/>
-          </a:bodyPr>
-          <a:lstStyle/>
           <a:p>
             <a:endParaRPr lang="en-US" dirty="0"/>
           </a:p>
@@ -3939,6 +3917,22 @@
             <a:r>
               <a:rPr lang="en-US" dirty="0" smtClean="0"/>
               <a:t>)</a:t>
+            </a:r>
+          </a:p>
+          <a:p>
+            <a:r>
+              <a:rPr lang="en-US" dirty="0" err="1" smtClean="0"/>
+              <a:t>Saturedays</a:t>
+            </a:r>
+            <a:r>
+              <a:rPr lang="en-US" dirty="0" smtClean="0"/>
+              <a:t>: 0</a:t>
+            </a:r>
+          </a:p>
+          <a:p>
+            <a:r>
+              <a:rPr lang="en-US" dirty="0" smtClean="0"/>
+              <a:t>Sundays: 300-400</a:t>
             </a:r>
             <a:endParaRPr lang="en-US" dirty="0"/>
           </a:p>

</xml_diff>